<commit_message>
zai going zi sheng
</commit_message>
<xml_diff>
--- a/numfu.pptx
+++ b/numfu.pptx
@@ -7,8 +7,9 @@
   <p:sldIdLst>
     <p:sldId id="256" r:id="rId2"/>
     <p:sldId id="258" r:id="rId3"/>
-    <p:sldId id="257" r:id="rId4"/>
-    <p:sldId id="259" r:id="rId5"/>
+    <p:sldId id="260" r:id="rId4"/>
+    <p:sldId id="257" r:id="rId5"/>
+    <p:sldId id="259" r:id="rId6"/>
   </p:sldIdLst>
   <p:sldSz cx="12192000" cy="6858000"/>
   <p:notesSz cx="6858000" cy="9144000"/>
@@ -107,6 +108,11 @@
       </a:defRPr>
     </a:lvl9pPr>
   </p:defaultTextStyle>
+  <p:extLst>
+    <p:ext uri="{EFAFB233-063F-42B5-8137-9DF3F51BA10A}">
+      <p15:sldGuideLst xmlns:p15="http://schemas.microsoft.com/office/powerpoint/2012/main"/>
+    </p:ext>
+  </p:extLst>
 </p:presentation>
 </file>
 
@@ -3387,54 +3393,52 @@
               <a:gdLst>
                 <a:gd name="connsiteX0" fmla="*/ 0 w 5805182"/>
                 <a:gd name="connsiteY0" fmla="*/ 0 h 1669409"/>
-                <a:gd name="connsiteX1" fmla="*/ 703072 w 5805182"/>
+                <a:gd name="connsiteX1" fmla="*/ 586968 w 5805182"/>
                 <a:gd name="connsiteY1" fmla="*/ 0 h 1669409"/>
-                <a:gd name="connsiteX2" fmla="*/ 1231989 w 5805182"/>
+                <a:gd name="connsiteX2" fmla="*/ 1290040 w 5805182"/>
                 <a:gd name="connsiteY2" fmla="*/ 0 h 1669409"/>
-                <a:gd name="connsiteX3" fmla="*/ 1935061 w 5805182"/>
+                <a:gd name="connsiteX3" fmla="*/ 2051164 w 5805182"/>
                 <a:gd name="connsiteY3" fmla="*/ 0 h 1669409"/>
                 <a:gd name="connsiteX4" fmla="*/ 2638133 w 5805182"/>
                 <a:gd name="connsiteY4" fmla="*/ 0 h 1669409"/>
-                <a:gd name="connsiteX5" fmla="*/ 3283153 w 5805182"/>
+                <a:gd name="connsiteX5" fmla="*/ 3225101 w 5805182"/>
                 <a:gd name="connsiteY5" fmla="*/ 0 h 1669409"/>
-                <a:gd name="connsiteX6" fmla="*/ 3812070 w 5805182"/>
+                <a:gd name="connsiteX6" fmla="*/ 3870121 w 5805182"/>
                 <a:gd name="connsiteY6" fmla="*/ 0 h 1669409"/>
-                <a:gd name="connsiteX7" fmla="*/ 4340986 w 5805182"/>
+                <a:gd name="connsiteX7" fmla="*/ 4573193 w 5805182"/>
                 <a:gd name="connsiteY7" fmla="*/ 0 h 1669409"/>
-                <a:gd name="connsiteX8" fmla="*/ 5102110 w 5805182"/>
+                <a:gd name="connsiteX8" fmla="*/ 5805182 w 5805182"/>
                 <a:gd name="connsiteY8" fmla="*/ 0 h 1669409"/>
                 <a:gd name="connsiteX9" fmla="*/ 5805182 w 5805182"/>
-                <a:gd name="connsiteY9" fmla="*/ 0 h 1669409"/>
+                <a:gd name="connsiteY9" fmla="*/ 506387 h 1669409"/>
                 <a:gd name="connsiteX10" fmla="*/ 5805182 w 5805182"/>
-                <a:gd name="connsiteY10" fmla="*/ 573164 h 1669409"/>
+                <a:gd name="connsiteY10" fmla="*/ 1079551 h 1669409"/>
                 <a:gd name="connsiteX11" fmla="*/ 5805182 w 5805182"/>
-                <a:gd name="connsiteY11" fmla="*/ 1146328 h 1669409"/>
-                <a:gd name="connsiteX12" fmla="*/ 5805182 w 5805182"/>
+                <a:gd name="connsiteY11" fmla="*/ 1669409 h 1669409"/>
+                <a:gd name="connsiteX12" fmla="*/ 5276265 w 5805182"/>
                 <a:gd name="connsiteY12" fmla="*/ 1669409 h 1669409"/>
-                <a:gd name="connsiteX13" fmla="*/ 5334317 w 5805182"/>
+                <a:gd name="connsiteX13" fmla="*/ 4747349 w 5805182"/>
                 <a:gd name="connsiteY13" fmla="*/ 1669409 h 1669409"/>
-                <a:gd name="connsiteX14" fmla="*/ 4573193 w 5805182"/>
+                <a:gd name="connsiteX14" fmla="*/ 4102329 w 5805182"/>
                 <a:gd name="connsiteY14" fmla="*/ 1669409 h 1669409"/>
-                <a:gd name="connsiteX15" fmla="*/ 3812070 w 5805182"/>
+                <a:gd name="connsiteX15" fmla="*/ 3341205 w 5805182"/>
                 <a:gd name="connsiteY15" fmla="*/ 1669409 h 1669409"/>
-                <a:gd name="connsiteX16" fmla="*/ 3341205 w 5805182"/>
+                <a:gd name="connsiteX16" fmla="*/ 2580081 w 5805182"/>
                 <a:gd name="connsiteY16" fmla="*/ 1669409 h 1669409"/>
-                <a:gd name="connsiteX17" fmla="*/ 2580081 w 5805182"/>
+                <a:gd name="connsiteX17" fmla="*/ 1935061 w 5805182"/>
                 <a:gd name="connsiteY17" fmla="*/ 1669409 h 1669409"/>
-                <a:gd name="connsiteX18" fmla="*/ 2051164 w 5805182"/>
+                <a:gd name="connsiteX18" fmla="*/ 1464196 w 5805182"/>
                 <a:gd name="connsiteY18" fmla="*/ 1669409 h 1669409"/>
-                <a:gd name="connsiteX19" fmla="*/ 1348092 w 5805182"/>
+                <a:gd name="connsiteX19" fmla="*/ 819176 w 5805182"/>
                 <a:gd name="connsiteY19" fmla="*/ 1669409 h 1669409"/>
-                <a:gd name="connsiteX20" fmla="*/ 703072 w 5805182"/>
+                <a:gd name="connsiteX20" fmla="*/ 0 w 5805182"/>
                 <a:gd name="connsiteY20" fmla="*/ 1669409 h 1669409"/>
                 <a:gd name="connsiteX21" fmla="*/ 0 w 5805182"/>
-                <a:gd name="connsiteY21" fmla="*/ 1669409 h 1669409"/>
+                <a:gd name="connsiteY21" fmla="*/ 1079551 h 1669409"/>
                 <a:gd name="connsiteX22" fmla="*/ 0 w 5805182"/>
-                <a:gd name="connsiteY22" fmla="*/ 1163022 h 1669409"/>
+                <a:gd name="connsiteY22" fmla="*/ 556470 h 1669409"/>
                 <a:gd name="connsiteX23" fmla="*/ 0 w 5805182"/>
-                <a:gd name="connsiteY23" fmla="*/ 573164 h 1669409"/>
-                <a:gd name="connsiteX24" fmla="*/ 0 w 5805182"/>
-                <a:gd name="connsiteY24" fmla="*/ 0 h 1669409"/>
+                <a:gd name="connsiteY23" fmla="*/ 0 h 1669409"/>
               </a:gdLst>
               <a:ahLst/>
               <a:cxnLst>
@@ -3510,139 +3514,10 @@
                 <a:cxn ang="0">
                   <a:pos x="connsiteX23" y="connsiteY23"/>
                 </a:cxn>
-                <a:cxn ang="0">
-                  <a:pos x="connsiteX24" y="connsiteY24"/>
-                </a:cxn>
               </a:cxnLst>
               <a:rect l="l" t="t" r="r" b="b"/>
               <a:pathLst>
-                <a:path w="5805182" h="1669409" fill="none" extrusionOk="0">
-                  <a:moveTo>
-                    <a:pt x="0" y="0"/>
-                  </a:moveTo>
-                  <a:cubicBezTo>
-                    <a:pt x="280300" y="-9150"/>
-                    <a:pt x="443984" y="6057"/>
-                    <a:pt x="703072" y="0"/>
-                  </a:cubicBezTo>
-                  <a:cubicBezTo>
-                    <a:pt x="962160" y="-6057"/>
-                    <a:pt x="992363" y="-2358"/>
-                    <a:pt x="1231989" y="0"/>
-                  </a:cubicBezTo>
-                  <a:cubicBezTo>
-                    <a:pt x="1471615" y="2358"/>
-                    <a:pt x="1770544" y="6181"/>
-                    <a:pt x="1935061" y="0"/>
-                  </a:cubicBezTo>
-                  <a:cubicBezTo>
-                    <a:pt x="2099578" y="-6181"/>
-                    <a:pt x="2302441" y="7941"/>
-                    <a:pt x="2638133" y="0"/>
-                  </a:cubicBezTo>
-                  <a:cubicBezTo>
-                    <a:pt x="2973825" y="-7941"/>
-                    <a:pt x="2988206" y="-9867"/>
-                    <a:pt x="3283153" y="0"/>
-                  </a:cubicBezTo>
-                  <a:cubicBezTo>
-                    <a:pt x="3578100" y="9867"/>
-                    <a:pt x="3569122" y="17959"/>
-                    <a:pt x="3812070" y="0"/>
-                  </a:cubicBezTo>
-                  <a:cubicBezTo>
-                    <a:pt x="4055018" y="-17959"/>
-                    <a:pt x="4220202" y="160"/>
-                    <a:pt x="4340986" y="0"/>
-                  </a:cubicBezTo>
-                  <a:cubicBezTo>
-                    <a:pt x="4461770" y="-160"/>
-                    <a:pt x="4814326" y="30192"/>
-                    <a:pt x="5102110" y="0"/>
-                  </a:cubicBezTo>
-                  <a:cubicBezTo>
-                    <a:pt x="5389894" y="-30192"/>
-                    <a:pt x="5648510" y="-1849"/>
-                    <a:pt x="5805182" y="0"/>
-                  </a:cubicBezTo>
-                  <a:cubicBezTo>
-                    <a:pt x="5830715" y="221666"/>
-                    <a:pt x="5822658" y="434650"/>
-                    <a:pt x="5805182" y="573164"/>
-                  </a:cubicBezTo>
-                  <a:cubicBezTo>
-                    <a:pt x="5787706" y="711678"/>
-                    <a:pt x="5825268" y="1030675"/>
-                    <a:pt x="5805182" y="1146328"/>
-                  </a:cubicBezTo>
-                  <a:cubicBezTo>
-                    <a:pt x="5785096" y="1261981"/>
-                    <a:pt x="5792460" y="1473961"/>
-                    <a:pt x="5805182" y="1669409"/>
-                  </a:cubicBezTo>
-                  <a:cubicBezTo>
-                    <a:pt x="5683911" y="1655656"/>
-                    <a:pt x="5547128" y="1646845"/>
-                    <a:pt x="5334317" y="1669409"/>
-                  </a:cubicBezTo>
-                  <a:cubicBezTo>
-                    <a:pt x="5121506" y="1691973"/>
-                    <a:pt x="4858578" y="1650303"/>
-                    <a:pt x="4573193" y="1669409"/>
-                  </a:cubicBezTo>
-                  <a:cubicBezTo>
-                    <a:pt x="4287808" y="1688515"/>
-                    <a:pt x="4042727" y="1664611"/>
-                    <a:pt x="3812070" y="1669409"/>
-                  </a:cubicBezTo>
-                  <a:cubicBezTo>
-                    <a:pt x="3581413" y="1674207"/>
-                    <a:pt x="3574081" y="1688309"/>
-                    <a:pt x="3341205" y="1669409"/>
-                  </a:cubicBezTo>
-                  <a:cubicBezTo>
-                    <a:pt x="3108330" y="1650509"/>
-                    <a:pt x="2909408" y="1667398"/>
-                    <a:pt x="2580081" y="1669409"/>
-                  </a:cubicBezTo>
-                  <a:cubicBezTo>
-                    <a:pt x="2250754" y="1671420"/>
-                    <a:pt x="2183227" y="1665630"/>
-                    <a:pt x="2051164" y="1669409"/>
-                  </a:cubicBezTo>
-                  <a:cubicBezTo>
-                    <a:pt x="1919101" y="1673188"/>
-                    <a:pt x="1490256" y="1704401"/>
-                    <a:pt x="1348092" y="1669409"/>
-                  </a:cubicBezTo>
-                  <a:cubicBezTo>
-                    <a:pt x="1205928" y="1634417"/>
-                    <a:pt x="993629" y="1663411"/>
-                    <a:pt x="703072" y="1669409"/>
-                  </a:cubicBezTo>
-                  <a:cubicBezTo>
-                    <a:pt x="412515" y="1675407"/>
-                    <a:pt x="165664" y="1652519"/>
-                    <a:pt x="0" y="1669409"/>
-                  </a:cubicBezTo>
-                  <a:cubicBezTo>
-                    <a:pt x="-20277" y="1529423"/>
-                    <a:pt x="14704" y="1403526"/>
-                    <a:pt x="0" y="1163022"/>
-                  </a:cubicBezTo>
-                  <a:cubicBezTo>
-                    <a:pt x="-14704" y="922518"/>
-                    <a:pt x="12140" y="703843"/>
-                    <a:pt x="0" y="573164"/>
-                  </a:cubicBezTo>
-                  <a:cubicBezTo>
-                    <a:pt x="-12140" y="442485"/>
-                    <a:pt x="-24181" y="129109"/>
-                    <a:pt x="0" y="0"/>
-                  </a:cubicBezTo>
-                  <a:close/>
-                </a:path>
-                <a:path w="5805182" h="1669409" stroke="0" extrusionOk="0">
+                <a:path w="5805182" h="1669409" extrusionOk="0">
                   <a:moveTo>
                     <a:pt x="0" y="0"/>
                   </a:moveTo>
@@ -4051,54 +3926,52 @@
               <a:gdLst>
                 <a:gd name="connsiteX0" fmla="*/ 0 w 5805182"/>
                 <a:gd name="connsiteY0" fmla="*/ 0 h 1669409"/>
-                <a:gd name="connsiteX1" fmla="*/ 703072 w 5805182"/>
+                <a:gd name="connsiteX1" fmla="*/ 586968 w 5805182"/>
                 <a:gd name="connsiteY1" fmla="*/ 0 h 1669409"/>
-                <a:gd name="connsiteX2" fmla="*/ 1231989 w 5805182"/>
+                <a:gd name="connsiteX2" fmla="*/ 1290040 w 5805182"/>
                 <a:gd name="connsiteY2" fmla="*/ 0 h 1669409"/>
-                <a:gd name="connsiteX3" fmla="*/ 1935061 w 5805182"/>
+                <a:gd name="connsiteX3" fmla="*/ 2051164 w 5805182"/>
                 <a:gd name="connsiteY3" fmla="*/ 0 h 1669409"/>
                 <a:gd name="connsiteX4" fmla="*/ 2638133 w 5805182"/>
                 <a:gd name="connsiteY4" fmla="*/ 0 h 1669409"/>
-                <a:gd name="connsiteX5" fmla="*/ 3283153 w 5805182"/>
+                <a:gd name="connsiteX5" fmla="*/ 3225101 w 5805182"/>
                 <a:gd name="connsiteY5" fmla="*/ 0 h 1669409"/>
-                <a:gd name="connsiteX6" fmla="*/ 3812070 w 5805182"/>
+                <a:gd name="connsiteX6" fmla="*/ 3870121 w 5805182"/>
                 <a:gd name="connsiteY6" fmla="*/ 0 h 1669409"/>
-                <a:gd name="connsiteX7" fmla="*/ 4340986 w 5805182"/>
+                <a:gd name="connsiteX7" fmla="*/ 4573193 w 5805182"/>
                 <a:gd name="connsiteY7" fmla="*/ 0 h 1669409"/>
-                <a:gd name="connsiteX8" fmla="*/ 5102110 w 5805182"/>
+                <a:gd name="connsiteX8" fmla="*/ 5805182 w 5805182"/>
                 <a:gd name="connsiteY8" fmla="*/ 0 h 1669409"/>
                 <a:gd name="connsiteX9" fmla="*/ 5805182 w 5805182"/>
-                <a:gd name="connsiteY9" fmla="*/ 0 h 1669409"/>
+                <a:gd name="connsiteY9" fmla="*/ 506387 h 1669409"/>
                 <a:gd name="connsiteX10" fmla="*/ 5805182 w 5805182"/>
-                <a:gd name="connsiteY10" fmla="*/ 573164 h 1669409"/>
+                <a:gd name="connsiteY10" fmla="*/ 1079551 h 1669409"/>
                 <a:gd name="connsiteX11" fmla="*/ 5805182 w 5805182"/>
-                <a:gd name="connsiteY11" fmla="*/ 1146328 h 1669409"/>
-                <a:gd name="connsiteX12" fmla="*/ 5805182 w 5805182"/>
+                <a:gd name="connsiteY11" fmla="*/ 1669409 h 1669409"/>
+                <a:gd name="connsiteX12" fmla="*/ 5276265 w 5805182"/>
                 <a:gd name="connsiteY12" fmla="*/ 1669409 h 1669409"/>
-                <a:gd name="connsiteX13" fmla="*/ 5334317 w 5805182"/>
+                <a:gd name="connsiteX13" fmla="*/ 4747349 w 5805182"/>
                 <a:gd name="connsiteY13" fmla="*/ 1669409 h 1669409"/>
-                <a:gd name="connsiteX14" fmla="*/ 4573193 w 5805182"/>
+                <a:gd name="connsiteX14" fmla="*/ 4102329 w 5805182"/>
                 <a:gd name="connsiteY14" fmla="*/ 1669409 h 1669409"/>
-                <a:gd name="connsiteX15" fmla="*/ 3812070 w 5805182"/>
+                <a:gd name="connsiteX15" fmla="*/ 3341205 w 5805182"/>
                 <a:gd name="connsiteY15" fmla="*/ 1669409 h 1669409"/>
-                <a:gd name="connsiteX16" fmla="*/ 3341205 w 5805182"/>
+                <a:gd name="connsiteX16" fmla="*/ 2580081 w 5805182"/>
                 <a:gd name="connsiteY16" fmla="*/ 1669409 h 1669409"/>
-                <a:gd name="connsiteX17" fmla="*/ 2580081 w 5805182"/>
+                <a:gd name="connsiteX17" fmla="*/ 1935061 w 5805182"/>
                 <a:gd name="connsiteY17" fmla="*/ 1669409 h 1669409"/>
-                <a:gd name="connsiteX18" fmla="*/ 2051164 w 5805182"/>
+                <a:gd name="connsiteX18" fmla="*/ 1464196 w 5805182"/>
                 <a:gd name="connsiteY18" fmla="*/ 1669409 h 1669409"/>
-                <a:gd name="connsiteX19" fmla="*/ 1348092 w 5805182"/>
+                <a:gd name="connsiteX19" fmla="*/ 819176 w 5805182"/>
                 <a:gd name="connsiteY19" fmla="*/ 1669409 h 1669409"/>
-                <a:gd name="connsiteX20" fmla="*/ 703072 w 5805182"/>
+                <a:gd name="connsiteX20" fmla="*/ 0 w 5805182"/>
                 <a:gd name="connsiteY20" fmla="*/ 1669409 h 1669409"/>
                 <a:gd name="connsiteX21" fmla="*/ 0 w 5805182"/>
-                <a:gd name="connsiteY21" fmla="*/ 1669409 h 1669409"/>
+                <a:gd name="connsiteY21" fmla="*/ 1079551 h 1669409"/>
                 <a:gd name="connsiteX22" fmla="*/ 0 w 5805182"/>
-                <a:gd name="connsiteY22" fmla="*/ 1163022 h 1669409"/>
+                <a:gd name="connsiteY22" fmla="*/ 556470 h 1669409"/>
                 <a:gd name="connsiteX23" fmla="*/ 0 w 5805182"/>
-                <a:gd name="connsiteY23" fmla="*/ 573164 h 1669409"/>
-                <a:gd name="connsiteX24" fmla="*/ 0 w 5805182"/>
-                <a:gd name="connsiteY24" fmla="*/ 0 h 1669409"/>
+                <a:gd name="connsiteY23" fmla="*/ 0 h 1669409"/>
               </a:gdLst>
               <a:ahLst/>
               <a:cxnLst>
@@ -4174,139 +4047,10 @@
                 <a:cxn ang="0">
                   <a:pos x="connsiteX23" y="connsiteY23"/>
                 </a:cxn>
-                <a:cxn ang="0">
-                  <a:pos x="connsiteX24" y="connsiteY24"/>
-                </a:cxn>
               </a:cxnLst>
               <a:rect l="l" t="t" r="r" b="b"/>
               <a:pathLst>
-                <a:path w="5805182" h="1669409" fill="none" extrusionOk="0">
-                  <a:moveTo>
-                    <a:pt x="0" y="0"/>
-                  </a:moveTo>
-                  <a:cubicBezTo>
-                    <a:pt x="280300" y="-9150"/>
-                    <a:pt x="443984" y="6057"/>
-                    <a:pt x="703072" y="0"/>
-                  </a:cubicBezTo>
-                  <a:cubicBezTo>
-                    <a:pt x="962160" y="-6057"/>
-                    <a:pt x="992363" y="-2358"/>
-                    <a:pt x="1231989" y="0"/>
-                  </a:cubicBezTo>
-                  <a:cubicBezTo>
-                    <a:pt x="1471615" y="2358"/>
-                    <a:pt x="1770544" y="6181"/>
-                    <a:pt x="1935061" y="0"/>
-                  </a:cubicBezTo>
-                  <a:cubicBezTo>
-                    <a:pt x="2099578" y="-6181"/>
-                    <a:pt x="2302441" y="7941"/>
-                    <a:pt x="2638133" y="0"/>
-                  </a:cubicBezTo>
-                  <a:cubicBezTo>
-                    <a:pt x="2973825" y="-7941"/>
-                    <a:pt x="2988206" y="-9867"/>
-                    <a:pt x="3283153" y="0"/>
-                  </a:cubicBezTo>
-                  <a:cubicBezTo>
-                    <a:pt x="3578100" y="9867"/>
-                    <a:pt x="3569122" y="17959"/>
-                    <a:pt x="3812070" y="0"/>
-                  </a:cubicBezTo>
-                  <a:cubicBezTo>
-                    <a:pt x="4055018" y="-17959"/>
-                    <a:pt x="4220202" y="160"/>
-                    <a:pt x="4340986" y="0"/>
-                  </a:cubicBezTo>
-                  <a:cubicBezTo>
-                    <a:pt x="4461770" y="-160"/>
-                    <a:pt x="4814326" y="30192"/>
-                    <a:pt x="5102110" y="0"/>
-                  </a:cubicBezTo>
-                  <a:cubicBezTo>
-                    <a:pt x="5389894" y="-30192"/>
-                    <a:pt x="5648510" y="-1849"/>
-                    <a:pt x="5805182" y="0"/>
-                  </a:cubicBezTo>
-                  <a:cubicBezTo>
-                    <a:pt x="5830715" y="221666"/>
-                    <a:pt x="5822658" y="434650"/>
-                    <a:pt x="5805182" y="573164"/>
-                  </a:cubicBezTo>
-                  <a:cubicBezTo>
-                    <a:pt x="5787706" y="711678"/>
-                    <a:pt x="5825268" y="1030675"/>
-                    <a:pt x="5805182" y="1146328"/>
-                  </a:cubicBezTo>
-                  <a:cubicBezTo>
-                    <a:pt x="5785096" y="1261981"/>
-                    <a:pt x="5792460" y="1473961"/>
-                    <a:pt x="5805182" y="1669409"/>
-                  </a:cubicBezTo>
-                  <a:cubicBezTo>
-                    <a:pt x="5683911" y="1655656"/>
-                    <a:pt x="5547128" y="1646845"/>
-                    <a:pt x="5334317" y="1669409"/>
-                  </a:cubicBezTo>
-                  <a:cubicBezTo>
-                    <a:pt x="5121506" y="1691973"/>
-                    <a:pt x="4858578" y="1650303"/>
-                    <a:pt x="4573193" y="1669409"/>
-                  </a:cubicBezTo>
-                  <a:cubicBezTo>
-                    <a:pt x="4287808" y="1688515"/>
-                    <a:pt x="4042727" y="1664611"/>
-                    <a:pt x="3812070" y="1669409"/>
-                  </a:cubicBezTo>
-                  <a:cubicBezTo>
-                    <a:pt x="3581413" y="1674207"/>
-                    <a:pt x="3574081" y="1688309"/>
-                    <a:pt x="3341205" y="1669409"/>
-                  </a:cubicBezTo>
-                  <a:cubicBezTo>
-                    <a:pt x="3108330" y="1650509"/>
-                    <a:pt x="2909408" y="1667398"/>
-                    <a:pt x="2580081" y="1669409"/>
-                  </a:cubicBezTo>
-                  <a:cubicBezTo>
-                    <a:pt x="2250754" y="1671420"/>
-                    <a:pt x="2183227" y="1665630"/>
-                    <a:pt x="2051164" y="1669409"/>
-                  </a:cubicBezTo>
-                  <a:cubicBezTo>
-                    <a:pt x="1919101" y="1673188"/>
-                    <a:pt x="1490256" y="1704401"/>
-                    <a:pt x="1348092" y="1669409"/>
-                  </a:cubicBezTo>
-                  <a:cubicBezTo>
-                    <a:pt x="1205928" y="1634417"/>
-                    <a:pt x="993629" y="1663411"/>
-                    <a:pt x="703072" y="1669409"/>
-                  </a:cubicBezTo>
-                  <a:cubicBezTo>
-                    <a:pt x="412515" y="1675407"/>
-                    <a:pt x="165664" y="1652519"/>
-                    <a:pt x="0" y="1669409"/>
-                  </a:cubicBezTo>
-                  <a:cubicBezTo>
-                    <a:pt x="-20277" y="1529423"/>
-                    <a:pt x="14704" y="1403526"/>
-                    <a:pt x="0" y="1163022"/>
-                  </a:cubicBezTo>
-                  <a:cubicBezTo>
-                    <a:pt x="-14704" y="922518"/>
-                    <a:pt x="12140" y="703843"/>
-                    <a:pt x="0" y="573164"/>
-                  </a:cubicBezTo>
-                  <a:cubicBezTo>
-                    <a:pt x="-12140" y="442485"/>
-                    <a:pt x="-24181" y="129109"/>
-                    <a:pt x="0" y="0"/>
-                  </a:cubicBezTo>
-                  <a:close/>
-                </a:path>
-                <a:path w="5805182" h="1669409" stroke="0" extrusionOk="0">
+                <a:path w="5805182" h="1669409" extrusionOk="0">
                   <a:moveTo>
                     <a:pt x="0" y="0"/>
                   </a:moveTo>
@@ -4642,9 +4386,9 @@
         <p:grpSpPr>
           <a:xfrm>
             <a:off x="8237742" y="1835231"/>
-            <a:ext cx="3753954" cy="2488705"/>
+            <a:ext cx="3376568" cy="2488705"/>
             <a:chOff x="8237742" y="1835231"/>
-            <a:chExt cx="3753954" cy="2488705"/>
+            <a:chExt cx="3376568" cy="2488705"/>
           </a:xfrm>
         </p:grpSpPr>
         <p:grpSp>
@@ -4662,9 +4406,9 @@
           <p:grpSpPr>
             <a:xfrm>
               <a:off x="8237742" y="2201583"/>
-              <a:ext cx="3753954" cy="1922910"/>
+              <a:ext cx="3376568" cy="1922910"/>
               <a:chOff x="710270" y="3388570"/>
-              <a:chExt cx="1632155" cy="1305713"/>
+              <a:chExt cx="1468074" cy="1305713"/>
             </a:xfrm>
           </p:grpSpPr>
           <p:sp>
@@ -4727,8 +4471,8 @@
             </p:nvSpPr>
             <p:spPr>
               <a:xfrm rot="21022874">
-                <a:off x="1093034" y="3683639"/>
-                <a:ext cx="1249391" cy="480676"/>
+                <a:off x="1177635" y="3768465"/>
+                <a:ext cx="373685" cy="480676"/>
               </a:xfrm>
               <a:prstGeom prst="rect">
                 <a:avLst/>
@@ -4748,7 +4492,7 @@
                     </a:solidFill>
                     <a:latin typeface="Nyala" panose="02000504070300020003" pitchFamily="2" charset="0"/>
                   </a:rPr>
-                  <a:t>Mu_flip</a:t>
+                  <a:t>dui</a:t>
                 </a:r>
                 <a:endParaRPr lang="en-CA" sz="4000" dirty="0">
                   <a:solidFill>
@@ -4935,6 +4679,91 @@
           </a:p>
         </p:txBody>
       </p:sp>
+      <p:sp>
+        <p:nvSpPr>
+          <p:cNvPr id="19" name="TextBox 18">
+            <a:extLst>
+              <a:ext uri="{FF2B5EF4-FFF2-40B4-BE49-F238E27FC236}">
+                <a16:creationId xmlns:a16="http://schemas.microsoft.com/office/drawing/2014/main" id="{0B1FB3E5-31BF-46A7-AA17-D20BD5241F92}"/>
+              </a:ext>
+            </a:extLst>
+          </p:cNvPr>
+          <p:cNvSpPr txBox="1"/>
+          <p:nvPr/>
+        </p:nvSpPr>
+        <p:spPr>
+          <a:xfrm rot="21022874">
+            <a:off x="9035608" y="5240732"/>
+            <a:ext cx="2873597" cy="707887"/>
+          </a:xfrm>
+          <a:prstGeom prst="rect">
+            <a:avLst/>
+          </a:prstGeom>
+          <a:noFill/>
+        </p:spPr>
+        <p:txBody>
+          <a:bodyPr wrap="square" rtlCol="0">
+            <a:spAutoFit/>
+          </a:bodyPr>
+          <a:lstStyle/>
+          <a:p>
+            <a:r>
+              <a:rPr lang="en-US" sz="4000" dirty="0">
+                <a:latin typeface="Nyala" panose="02000504070300020003" pitchFamily="2" charset="0"/>
+              </a:rPr>
+              <a:t>Mu_flip</a:t>
+            </a:r>
+            <a:endParaRPr lang="en-CA" sz="4000" dirty="0">
+              <a:latin typeface="Nyala" panose="02000504070300020003" pitchFamily="2" charset="0"/>
+            </a:endParaRPr>
+          </a:p>
+        </p:txBody>
+      </p:sp>
+      <p:sp>
+        <p:nvSpPr>
+          <p:cNvPr id="20" name="TextBox 19">
+            <a:extLst>
+              <a:ext uri="{FF2B5EF4-FFF2-40B4-BE49-F238E27FC236}">
+                <a16:creationId xmlns:a16="http://schemas.microsoft.com/office/drawing/2014/main" id="{2338E496-4C1D-4019-A5CC-1AC136F73B08}"/>
+              </a:ext>
+            </a:extLst>
+          </p:cNvPr>
+          <p:cNvSpPr txBox="1"/>
+          <p:nvPr/>
+        </p:nvSpPr>
+        <p:spPr>
+          <a:xfrm>
+            <a:off x="9124082" y="598563"/>
+            <a:ext cx="1236675" cy="1569660"/>
+          </a:xfrm>
+          <a:prstGeom prst="rect">
+            <a:avLst/>
+          </a:prstGeom>
+          <a:noFill/>
+        </p:spPr>
+        <p:txBody>
+          <a:bodyPr wrap="square">
+            <a:spAutoFit/>
+          </a:bodyPr>
+          <a:lstStyle/>
+          <a:p>
+            <a:r>
+              <a:rPr kumimoji="0" lang="zh-CN" altLang="en-US" sz="9600" b="0" i="0" u="none" strike="noStrike" cap="none" normalizeH="0" baseline="0" dirty="0">
+                <a:ln>
+                  <a:noFill/>
+                </a:ln>
+                <a:solidFill>
+                  <a:srgbClr val="202124"/>
+                </a:solidFill>
+                <a:effectLst/>
+                <a:latin typeface="inherit"/>
+              </a:rPr>
+              <a:t>对</a:t>
+            </a:r>
+            <a:endParaRPr lang="en-CA" sz="9600" dirty="0"/>
+          </a:p>
+        </p:txBody>
+      </p:sp>
     </p:spTree>
     <p:extLst>
       <p:ext uri="{BB962C8B-B14F-4D97-AF65-F5344CB8AC3E}">
@@ -6000,9 +5829,9 @@
         <p:grpSpPr>
           <a:xfrm>
             <a:off x="8296465" y="1835231"/>
-            <a:ext cx="3582178" cy="2488705"/>
+            <a:ext cx="3376567" cy="2488705"/>
             <a:chOff x="8296465" y="1835231"/>
-            <a:chExt cx="3582178" cy="2488705"/>
+            <a:chExt cx="3376567" cy="2488705"/>
           </a:xfrm>
         </p:grpSpPr>
         <p:grpSp>
@@ -6020,9 +5849,9 @@
           <p:grpSpPr>
             <a:xfrm>
               <a:off x="8296465" y="2168223"/>
-              <a:ext cx="3582178" cy="1922910"/>
+              <a:ext cx="3376567" cy="1922910"/>
               <a:chOff x="735802" y="3365917"/>
-              <a:chExt cx="1557470" cy="1305713"/>
+              <a:chExt cx="1468074" cy="1305713"/>
             </a:xfrm>
           </p:grpSpPr>
           <p:sp>
@@ -6085,8 +5914,8 @@
             </p:nvSpPr>
             <p:spPr>
               <a:xfrm rot="21022874">
-                <a:off x="1043881" y="3637644"/>
-                <a:ext cx="1249391" cy="480676"/>
+                <a:off x="1295042" y="3647073"/>
+                <a:ext cx="318592" cy="626968"/>
               </a:xfrm>
               <a:prstGeom prst="rect">
                 <a:avLst/>
@@ -6100,15 +5929,15 @@
               <a:lstStyle/>
               <a:p>
                 <a:r>
-                  <a:rPr lang="en-US" sz="4000" dirty="0" err="1">
+                  <a:rPr lang="en-US" sz="5400" dirty="0">
                     <a:solidFill>
                       <a:schemeClr val="bg1"/>
                     </a:solidFill>
                     <a:latin typeface="Nyala" panose="02000504070300020003" pitchFamily="2" charset="0"/>
                   </a:rPr>
-                  <a:t>Nu_deem</a:t>
+                  <a:t>zi</a:t>
                 </a:r>
-                <a:endParaRPr lang="en-CA" sz="4000" dirty="0">
+                <a:endParaRPr lang="en-CA" sz="5400" dirty="0">
                   <a:solidFill>
                     <a:schemeClr val="bg1"/>
                   </a:solidFill>
@@ -6486,6 +6315,189 @@
           </a:p>
         </p:txBody>
       </p:sp>
+      <p:sp>
+        <p:nvSpPr>
+          <p:cNvPr id="20" name="TextBox 19">
+            <a:extLst>
+              <a:ext uri="{FF2B5EF4-FFF2-40B4-BE49-F238E27FC236}">
+                <a16:creationId xmlns:a16="http://schemas.microsoft.com/office/drawing/2014/main" id="{BEEE887D-6B3E-4DDF-B3D1-0355D11E82F2}"/>
+              </a:ext>
+            </a:extLst>
+          </p:cNvPr>
+          <p:cNvSpPr txBox="1"/>
+          <p:nvPr/>
+        </p:nvSpPr>
+        <p:spPr>
+          <a:xfrm rot="21022874">
+            <a:off x="9005047" y="5430450"/>
+            <a:ext cx="2873597" cy="707887"/>
+          </a:xfrm>
+          <a:prstGeom prst="rect">
+            <a:avLst/>
+          </a:prstGeom>
+          <a:noFill/>
+        </p:spPr>
+        <p:txBody>
+          <a:bodyPr wrap="square" rtlCol="0">
+            <a:spAutoFit/>
+          </a:bodyPr>
+          <a:lstStyle/>
+          <a:p>
+            <a:r>
+              <a:rPr lang="en-US" sz="4000" dirty="0" err="1">
+                <a:latin typeface="Nyala" panose="02000504070300020003" pitchFamily="2" charset="0"/>
+              </a:rPr>
+              <a:t>Nu_deem</a:t>
+            </a:r>
+            <a:endParaRPr lang="en-CA" sz="4000" dirty="0">
+              <a:latin typeface="Nyala" panose="02000504070300020003" pitchFamily="2" charset="0"/>
+            </a:endParaRPr>
+          </a:p>
+        </p:txBody>
+      </p:sp>
+      <p:sp>
+        <p:nvSpPr>
+          <p:cNvPr id="14" name="Rectangle 4">
+            <a:extLst>
+              <a:ext uri="{FF2B5EF4-FFF2-40B4-BE49-F238E27FC236}">
+                <a16:creationId xmlns:a16="http://schemas.microsoft.com/office/drawing/2014/main" id="{5E4F2817-6786-441B-9D1C-B71F5F5A2787}"/>
+              </a:ext>
+            </a:extLst>
+          </p:cNvPr>
+          <p:cNvSpPr>
+            <a:spLocks noChangeArrowheads="1"/>
+          </p:cNvSpPr>
+          <p:nvPr/>
+        </p:nvSpPr>
+        <p:spPr bwMode="auto">
+          <a:xfrm>
+            <a:off x="0" y="179864"/>
+            <a:ext cx="22442" cy="97471"/>
+          </a:xfrm>
+          <a:prstGeom prst="rect">
+            <a:avLst/>
+          </a:prstGeom>
+          <a:solidFill>
+            <a:srgbClr val="F8F9FA"/>
+          </a:solidFill>
+          <a:ln>
+            <a:noFill/>
+          </a:ln>
+          <a:effectLst/>
+          <a:extLst>
+            <a:ext uri="{91240B29-F687-4F45-9708-019B960494DF}">
+              <a14:hiddenLine xmlns:a14="http://schemas.microsoft.com/office/drawing/2010/main" w="9525">
+                <a:solidFill>
+                  <a:schemeClr val="tx1"/>
+                </a:solidFill>
+                <a:miter lim="800000"/>
+                <a:headEnd/>
+                <a:tailEnd/>
+              </a14:hiddenLine>
+            </a:ext>
+            <a:ext uri="{AF507438-7753-43E0-B8FC-AC1667EBCBE1}">
+              <a14:hiddenEffects xmlns:a14="http://schemas.microsoft.com/office/drawing/2010/main">
+                <a:effectLst>
+                  <a:outerShdw dist="35921" dir="2700000" algn="ctr" rotWithShape="0">
+                    <a:schemeClr val="bg2"/>
+                  </a:outerShdw>
+                </a:effectLst>
+              </a14:hiddenEffects>
+            </a:ext>
+          </a:extLst>
+        </p:spPr>
+        <p:txBody>
+          <a:bodyPr vert="horz" wrap="none" lIns="0" tIns="-12696" rIns="0" bIns="-12696" numCol="1" anchor="ctr" anchorCtr="0" compatLnSpc="1">
+            <a:prstTxWarp prst="textNoShape">
+              <a:avLst/>
+            </a:prstTxWarp>
+            <a:spAutoFit/>
+          </a:bodyPr>
+          <a:lstStyle/>
+          <a:p>
+            <a:pPr marL="0" marR="0" lvl="0" indent="0" algn="l" defTabSz="914400" rtl="0" eaLnBrk="0" fontAlgn="base" latinLnBrk="0" hangingPunct="0">
+              <a:lnSpc>
+                <a:spcPct val="100000"/>
+              </a:lnSpc>
+              <a:spcBef>
+                <a:spcPct val="0"/>
+              </a:spcBef>
+              <a:spcAft>
+                <a:spcPct val="0"/>
+              </a:spcAft>
+              <a:buClrTx/>
+              <a:buSzTx/>
+              <a:buFontTx/>
+              <a:buNone/>
+              <a:tabLst/>
+            </a:pPr>
+            <a:r>
+              <a:rPr kumimoji="0" lang="zh-CN" altLang="en-US" sz="800" b="0" i="0" u="none" strike="noStrike" cap="none" normalizeH="0" baseline="0" dirty="0">
+                <a:ln>
+                  <a:noFill/>
+                </a:ln>
+                <a:solidFill>
+                  <a:schemeClr val="tx1"/>
+                </a:solidFill>
+                <a:effectLst/>
+              </a:rPr>
+              <a:t> </a:t>
+            </a:r>
+            <a:endParaRPr kumimoji="0" lang="zh-CN" altLang="en-US" sz="1800" b="0" i="0" u="none" strike="noStrike" cap="none" normalizeH="0" baseline="0" dirty="0">
+              <a:ln>
+                <a:noFill/>
+              </a:ln>
+              <a:solidFill>
+                <a:schemeClr val="tx1"/>
+              </a:solidFill>
+              <a:effectLst/>
+              <a:latin typeface="Arial" panose="020B0604020202020204" pitchFamily="34" charset="0"/>
+            </a:endParaRPr>
+          </a:p>
+        </p:txBody>
+      </p:sp>
+      <p:sp>
+        <p:nvSpPr>
+          <p:cNvPr id="27" name="TextBox 26">
+            <a:extLst>
+              <a:ext uri="{FF2B5EF4-FFF2-40B4-BE49-F238E27FC236}">
+                <a16:creationId xmlns:a16="http://schemas.microsoft.com/office/drawing/2014/main" id="{CD6CAF71-1332-4B66-AEF4-A1868A99C89C}"/>
+              </a:ext>
+            </a:extLst>
+          </p:cNvPr>
+          <p:cNvSpPr txBox="1"/>
+          <p:nvPr/>
+        </p:nvSpPr>
+        <p:spPr>
+          <a:xfrm>
+            <a:off x="9131771" y="392818"/>
+            <a:ext cx="1645643" cy="1569660"/>
+          </a:xfrm>
+          <a:prstGeom prst="rect">
+            <a:avLst/>
+          </a:prstGeom>
+          <a:noFill/>
+        </p:spPr>
+        <p:txBody>
+          <a:bodyPr wrap="square">
+            <a:spAutoFit/>
+          </a:bodyPr>
+          <a:lstStyle/>
+          <a:p>
+            <a:r>
+              <a:rPr lang="ja-JP" altLang="en-US" sz="9600" b="0" i="0" dirty="0">
+                <a:solidFill>
+                  <a:srgbClr val="333333"/>
+                </a:solidFill>
+                <a:effectLst/>
+                <a:latin typeface="Helvetica" panose="020B0604020202020204" pitchFamily="34" charset="0"/>
+              </a:rPr>
+              <a:t>子</a:t>
+            </a:r>
+            <a:endParaRPr lang="en-CA" sz="9600" dirty="0"/>
+          </a:p>
+        </p:txBody>
+      </p:sp>
     </p:spTree>
     <p:extLst>
       <p:ext uri="{BB962C8B-B14F-4D97-AF65-F5344CB8AC3E}">
@@ -6500,6 +6512,446 @@
 </file>
 
 <file path=ppt/slides/slide3.xml><?xml version="1.0" encoding="utf-8"?>
+<p:sld xmlns:a="http://schemas.openxmlformats.org/drawingml/2006/main" xmlns:r="http://schemas.openxmlformats.org/officeDocument/2006/relationships" xmlns:p="http://schemas.openxmlformats.org/presentationml/2006/main">
+  <p:cSld>
+    <p:spTree>
+      <p:nvGrpSpPr>
+        <p:cNvPr id="1" name=""/>
+        <p:cNvGrpSpPr/>
+        <p:nvPr/>
+      </p:nvGrpSpPr>
+      <p:grpSpPr>
+        <a:xfrm>
+          <a:off x="0" y="0"/>
+          <a:ext cx="0" cy="0"/>
+          <a:chOff x="0" y="0"/>
+          <a:chExt cx="0" cy="0"/>
+        </a:xfrm>
+      </p:grpSpPr>
+      <p:sp>
+        <p:nvSpPr>
+          <p:cNvPr id="6" name="TextBox 5">
+            <a:extLst>
+              <a:ext uri="{FF2B5EF4-FFF2-40B4-BE49-F238E27FC236}">
+                <a16:creationId xmlns:a16="http://schemas.microsoft.com/office/drawing/2014/main" id="{18C01DE6-0937-421F-8F53-D369C01D63FC}"/>
+              </a:ext>
+            </a:extLst>
+          </p:cNvPr>
+          <p:cNvSpPr txBox="1"/>
+          <p:nvPr/>
+        </p:nvSpPr>
+        <p:spPr>
+          <a:xfrm>
+            <a:off x="109057" y="81180"/>
+            <a:ext cx="1577130" cy="369332"/>
+          </a:xfrm>
+          <a:prstGeom prst="rect">
+            <a:avLst/>
+          </a:prstGeom>
+          <a:noFill/>
+        </p:spPr>
+        <p:txBody>
+          <a:bodyPr wrap="square" rtlCol="0">
+            <a:spAutoFit/>
+          </a:bodyPr>
+          <a:lstStyle/>
+          <a:p>
+            <a:r>
+              <a:rPr lang="en-US" dirty="0" err="1">
+                <a:latin typeface="Nyala" panose="02000504070300020003" pitchFamily="2" charset="0"/>
+              </a:rPr>
+              <a:t>Numfu</a:t>
+            </a:r>
+            <a:r>
+              <a:rPr lang="en-US" dirty="0">
+                <a:latin typeface="Nyala" panose="02000504070300020003" pitchFamily="2" charset="0"/>
+              </a:rPr>
+              <a:t> 0.1</a:t>
+            </a:r>
+            <a:endParaRPr lang="en-CA" dirty="0">
+              <a:latin typeface="Nyala" panose="02000504070300020003" pitchFamily="2" charset="0"/>
+            </a:endParaRPr>
+          </a:p>
+        </p:txBody>
+      </p:sp>
+      <p:grpSp>
+        <p:nvGrpSpPr>
+          <p:cNvPr id="22" name="Group 21">
+            <a:extLst>
+              <a:ext uri="{FF2B5EF4-FFF2-40B4-BE49-F238E27FC236}">
+                <a16:creationId xmlns:a16="http://schemas.microsoft.com/office/drawing/2014/main" id="{872F3404-C1B1-4B83-A3FD-F91F091A32E1}"/>
+              </a:ext>
+            </a:extLst>
+          </p:cNvPr>
+          <p:cNvGrpSpPr/>
+          <p:nvPr/>
+        </p:nvGrpSpPr>
+        <p:grpSpPr>
+          <a:xfrm>
+            <a:off x="8296465" y="1835231"/>
+            <a:ext cx="3376567" cy="2488705"/>
+            <a:chOff x="8296465" y="1835231"/>
+            <a:chExt cx="3376567" cy="2488705"/>
+          </a:xfrm>
+        </p:grpSpPr>
+        <p:grpSp>
+          <p:nvGrpSpPr>
+            <p:cNvPr id="11" name="Group 10">
+              <a:extLst>
+                <a:ext uri="{FF2B5EF4-FFF2-40B4-BE49-F238E27FC236}">
+                  <a16:creationId xmlns:a16="http://schemas.microsoft.com/office/drawing/2014/main" id="{417D3BE4-F164-41B9-AD6A-AE1F30458BA8}"/>
+                </a:ext>
+              </a:extLst>
+            </p:cNvPr>
+            <p:cNvGrpSpPr/>
+            <p:nvPr/>
+          </p:nvGrpSpPr>
+          <p:grpSpPr>
+            <a:xfrm>
+              <a:off x="8296465" y="2168223"/>
+              <a:ext cx="3376567" cy="1922910"/>
+              <a:chOff x="735802" y="3365917"/>
+              <a:chExt cx="1468074" cy="1305713"/>
+            </a:xfrm>
+          </p:grpSpPr>
+          <p:sp>
+            <p:nvSpPr>
+              <p:cNvPr id="10" name="Explosion: 8 Points 9">
+                <a:extLst>
+                  <a:ext uri="{FF2B5EF4-FFF2-40B4-BE49-F238E27FC236}">
+                    <a16:creationId xmlns:a16="http://schemas.microsoft.com/office/drawing/2014/main" id="{F3029E8F-96A0-4A4A-A914-298A0F3DCDF0}"/>
+                  </a:ext>
+                </a:extLst>
+              </p:cNvPr>
+              <p:cNvSpPr/>
+              <p:nvPr/>
+            </p:nvSpPr>
+            <p:spPr>
+              <a:xfrm>
+                <a:off x="735802" y="3365917"/>
+                <a:ext cx="1468074" cy="1305713"/>
+              </a:xfrm>
+              <a:prstGeom prst="irregularSeal1">
+                <a:avLst/>
+              </a:prstGeom>
+            </p:spPr>
+            <p:style>
+              <a:lnRef idx="2">
+                <a:schemeClr val="dk1">
+                  <a:shade val="50000"/>
+                </a:schemeClr>
+              </a:lnRef>
+              <a:fillRef idx="1">
+                <a:schemeClr val="dk1"/>
+              </a:fillRef>
+              <a:effectRef idx="0">
+                <a:schemeClr val="dk1"/>
+              </a:effectRef>
+              <a:fontRef idx="minor">
+                <a:schemeClr val="lt1"/>
+              </a:fontRef>
+            </p:style>
+            <p:txBody>
+              <a:bodyPr rtlCol="0" anchor="ctr"/>
+              <a:lstStyle/>
+              <a:p>
+                <a:pPr algn="ctr"/>
+                <a:endParaRPr lang="en-CA"/>
+              </a:p>
+            </p:txBody>
+          </p:sp>
+          <p:sp>
+            <p:nvSpPr>
+              <p:cNvPr id="7" name="TextBox 6">
+                <a:extLst>
+                  <a:ext uri="{FF2B5EF4-FFF2-40B4-BE49-F238E27FC236}">
+                    <a16:creationId xmlns:a16="http://schemas.microsoft.com/office/drawing/2014/main" id="{65457D18-D83D-4D82-926B-E6840171B95D}"/>
+                  </a:ext>
+                </a:extLst>
+              </p:cNvPr>
+              <p:cNvSpPr txBox="1"/>
+              <p:nvPr/>
+            </p:nvSpPr>
+            <p:spPr>
+              <a:xfrm rot="21022874">
+                <a:off x="1267938" y="3716820"/>
+                <a:ext cx="377580" cy="480676"/>
+              </a:xfrm>
+              <a:prstGeom prst="rect">
+                <a:avLst/>
+              </a:prstGeom>
+              <a:noFill/>
+            </p:spPr>
+            <p:txBody>
+              <a:bodyPr wrap="square" rtlCol="0">
+                <a:spAutoFit/>
+              </a:bodyPr>
+              <a:lstStyle/>
+              <a:p>
+                <a:r>
+                  <a:rPr lang="en-US" sz="4000" dirty="0" err="1">
+                    <a:solidFill>
+                      <a:schemeClr val="bg1"/>
+                    </a:solidFill>
+                    <a:latin typeface="Nyala" panose="02000504070300020003" pitchFamily="2" charset="0"/>
+                  </a:rPr>
+                  <a:t>zhi</a:t>
+                </a:r>
+                <a:endParaRPr lang="en-CA" sz="4000" dirty="0">
+                  <a:solidFill>
+                    <a:schemeClr val="bg1"/>
+                  </a:solidFill>
+                  <a:latin typeface="Nyala" panose="02000504070300020003" pitchFamily="2" charset="0"/>
+                </a:endParaRPr>
+              </a:p>
+            </p:txBody>
+          </p:sp>
+        </p:grpSp>
+        <p:cxnSp>
+          <p:nvCxnSpPr>
+            <p:cNvPr id="13" name="Straight Arrow Connector 12">
+              <a:extLst>
+                <a:ext uri="{FF2B5EF4-FFF2-40B4-BE49-F238E27FC236}">
+                  <a16:creationId xmlns:a16="http://schemas.microsoft.com/office/drawing/2014/main" id="{7F016CD6-156B-4212-AED9-4A30F61CAD76}"/>
+                </a:ext>
+              </a:extLst>
+            </p:cNvPr>
+            <p:cNvCxnSpPr>
+              <a:cxnSpLocks/>
+            </p:cNvCxnSpPr>
+            <p:nvPr/>
+          </p:nvCxnSpPr>
+          <p:spPr>
+            <a:xfrm flipH="1">
+              <a:off x="8623883" y="3836202"/>
+              <a:ext cx="586771" cy="487734"/>
+            </a:xfrm>
+            <a:prstGeom prst="straightConnector1">
+              <a:avLst/>
+            </a:prstGeom>
+            <a:ln w="76200">
+              <a:solidFill>
+                <a:schemeClr val="tx1">
+                  <a:lumMod val="95000"/>
+                  <a:lumOff val="5000"/>
+                </a:schemeClr>
+              </a:solidFill>
+              <a:tailEnd type="triangle"/>
+            </a:ln>
+          </p:spPr>
+          <p:style>
+            <a:lnRef idx="1">
+              <a:schemeClr val="accent1"/>
+            </a:lnRef>
+            <a:fillRef idx="0">
+              <a:schemeClr val="accent1"/>
+            </a:fillRef>
+            <a:effectRef idx="0">
+              <a:schemeClr val="accent1"/>
+            </a:effectRef>
+            <a:fontRef idx="minor">
+              <a:schemeClr val="tx1"/>
+            </a:fontRef>
+          </p:style>
+        </p:cxnSp>
+        <p:cxnSp>
+          <p:nvCxnSpPr>
+            <p:cNvPr id="15" name="Straight Arrow Connector 14">
+              <a:extLst>
+                <a:ext uri="{FF2B5EF4-FFF2-40B4-BE49-F238E27FC236}">
+                  <a16:creationId xmlns:a16="http://schemas.microsoft.com/office/drawing/2014/main" id="{E4208742-F220-41D6-B141-53D2F18E15B0}"/>
+                </a:ext>
+              </a:extLst>
+            </p:cNvPr>
+            <p:cNvCxnSpPr>
+              <a:cxnSpLocks/>
+            </p:cNvCxnSpPr>
+            <p:nvPr/>
+          </p:nvCxnSpPr>
+          <p:spPr>
+            <a:xfrm>
+              <a:off x="8627141" y="1835231"/>
+              <a:ext cx="583513" cy="558558"/>
+            </a:xfrm>
+            <a:prstGeom prst="straightConnector1">
+              <a:avLst/>
+            </a:prstGeom>
+            <a:ln w="76200">
+              <a:solidFill>
+                <a:schemeClr val="tx1">
+                  <a:lumMod val="95000"/>
+                  <a:lumOff val="5000"/>
+                </a:schemeClr>
+              </a:solidFill>
+              <a:tailEnd type="triangle"/>
+            </a:ln>
+          </p:spPr>
+          <p:style>
+            <a:lnRef idx="1">
+              <a:schemeClr val="accent1"/>
+            </a:lnRef>
+            <a:fillRef idx="0">
+              <a:schemeClr val="accent1"/>
+            </a:fillRef>
+            <a:effectRef idx="0">
+              <a:schemeClr val="accent1"/>
+            </a:effectRef>
+            <a:fontRef idx="minor">
+              <a:schemeClr val="tx1"/>
+            </a:fontRef>
+          </p:style>
+        </p:cxnSp>
+      </p:grpSp>
+      <p:sp>
+        <p:nvSpPr>
+          <p:cNvPr id="14" name="Rectangle 4">
+            <a:extLst>
+              <a:ext uri="{FF2B5EF4-FFF2-40B4-BE49-F238E27FC236}">
+                <a16:creationId xmlns:a16="http://schemas.microsoft.com/office/drawing/2014/main" id="{5E4F2817-6786-441B-9D1C-B71F5F5A2787}"/>
+              </a:ext>
+            </a:extLst>
+          </p:cNvPr>
+          <p:cNvSpPr>
+            <a:spLocks noChangeArrowheads="1"/>
+          </p:cNvSpPr>
+          <p:nvPr/>
+        </p:nvSpPr>
+        <p:spPr bwMode="auto">
+          <a:xfrm>
+            <a:off x="0" y="179864"/>
+            <a:ext cx="22442" cy="97471"/>
+          </a:xfrm>
+          <a:prstGeom prst="rect">
+            <a:avLst/>
+          </a:prstGeom>
+          <a:solidFill>
+            <a:srgbClr val="F8F9FA"/>
+          </a:solidFill>
+          <a:ln>
+            <a:noFill/>
+          </a:ln>
+          <a:effectLst/>
+          <a:extLst>
+            <a:ext uri="{91240B29-F687-4F45-9708-019B960494DF}">
+              <a14:hiddenLine xmlns:a14="http://schemas.microsoft.com/office/drawing/2010/main" w="9525">
+                <a:solidFill>
+                  <a:schemeClr val="tx1"/>
+                </a:solidFill>
+                <a:miter lim="800000"/>
+                <a:headEnd/>
+                <a:tailEnd/>
+              </a14:hiddenLine>
+            </a:ext>
+            <a:ext uri="{AF507438-7753-43E0-B8FC-AC1667EBCBE1}">
+              <a14:hiddenEffects xmlns:a14="http://schemas.microsoft.com/office/drawing/2010/main">
+                <a:effectLst>
+                  <a:outerShdw dist="35921" dir="2700000" algn="ctr" rotWithShape="0">
+                    <a:schemeClr val="bg2"/>
+                  </a:outerShdw>
+                </a:effectLst>
+              </a14:hiddenEffects>
+            </a:ext>
+          </a:extLst>
+        </p:spPr>
+        <p:txBody>
+          <a:bodyPr vert="horz" wrap="none" lIns="0" tIns="-12696" rIns="0" bIns="-12696" numCol="1" anchor="ctr" anchorCtr="0" compatLnSpc="1">
+            <a:prstTxWarp prst="textNoShape">
+              <a:avLst/>
+            </a:prstTxWarp>
+            <a:spAutoFit/>
+          </a:bodyPr>
+          <a:lstStyle/>
+          <a:p>
+            <a:pPr marL="0" marR="0" lvl="0" indent="0" algn="l" defTabSz="914400" rtl="0" eaLnBrk="0" fontAlgn="base" latinLnBrk="0" hangingPunct="0">
+              <a:lnSpc>
+                <a:spcPct val="100000"/>
+              </a:lnSpc>
+              <a:spcBef>
+                <a:spcPct val="0"/>
+              </a:spcBef>
+              <a:spcAft>
+                <a:spcPct val="0"/>
+              </a:spcAft>
+              <a:buClrTx/>
+              <a:buSzTx/>
+              <a:buFontTx/>
+              <a:buNone/>
+              <a:tabLst/>
+            </a:pPr>
+            <a:r>
+              <a:rPr kumimoji="0" lang="zh-CN" altLang="en-US" sz="800" b="0" i="0" u="none" strike="noStrike" cap="none" normalizeH="0" baseline="0" dirty="0">
+                <a:ln>
+                  <a:noFill/>
+                </a:ln>
+                <a:solidFill>
+                  <a:schemeClr val="tx1"/>
+                </a:solidFill>
+                <a:effectLst/>
+              </a:rPr>
+              <a:t> </a:t>
+            </a:r>
+            <a:endParaRPr kumimoji="0" lang="zh-CN" altLang="en-US" sz="1800" b="0" i="0" u="none" strike="noStrike" cap="none" normalizeH="0" baseline="0" dirty="0">
+              <a:ln>
+                <a:noFill/>
+              </a:ln>
+              <a:solidFill>
+                <a:schemeClr val="tx1"/>
+              </a:solidFill>
+              <a:effectLst/>
+              <a:latin typeface="Arial" panose="020B0604020202020204" pitchFamily="34" charset="0"/>
+            </a:endParaRPr>
+          </a:p>
+        </p:txBody>
+      </p:sp>
+      <p:sp>
+        <p:nvSpPr>
+          <p:cNvPr id="27" name="TextBox 26">
+            <a:extLst>
+              <a:ext uri="{FF2B5EF4-FFF2-40B4-BE49-F238E27FC236}">
+                <a16:creationId xmlns:a16="http://schemas.microsoft.com/office/drawing/2014/main" id="{CD6CAF71-1332-4B66-AEF4-A1868A99C89C}"/>
+              </a:ext>
+            </a:extLst>
+          </p:cNvPr>
+          <p:cNvSpPr txBox="1"/>
+          <p:nvPr/>
+        </p:nvSpPr>
+        <p:spPr>
+          <a:xfrm>
+            <a:off x="9131771" y="392818"/>
+            <a:ext cx="1645643" cy="1569660"/>
+          </a:xfrm>
+          <a:prstGeom prst="rect">
+            <a:avLst/>
+          </a:prstGeom>
+          <a:noFill/>
+        </p:spPr>
+        <p:txBody>
+          <a:bodyPr wrap="square">
+            <a:spAutoFit/>
+          </a:bodyPr>
+          <a:lstStyle/>
+          <a:p>
+            <a:r>
+              <a:rPr lang="en-CA" sz="9600" dirty="0"/>
+              <a:t>之</a:t>
+            </a:r>
+          </a:p>
+        </p:txBody>
+      </p:sp>
+    </p:spTree>
+    <p:extLst>
+      <p:ext uri="{BB962C8B-B14F-4D97-AF65-F5344CB8AC3E}">
+        <p14:creationId xmlns:p14="http://schemas.microsoft.com/office/powerpoint/2010/main" val="1198999851"/>
+      </p:ext>
+    </p:extLst>
+  </p:cSld>
+  <p:clrMapOvr>
+    <a:masterClrMapping/>
+  </p:clrMapOvr>
+</p:sld>
+</file>
+
+<file path=ppt/slides/slide4.xml><?xml version="1.0" encoding="utf-8"?>
 <p:sld xmlns:a="http://schemas.openxmlformats.org/drawingml/2006/main" xmlns:r="http://schemas.openxmlformats.org/officeDocument/2006/relationships" xmlns:p="http://schemas.openxmlformats.org/presentationml/2006/main">
   <p:cSld>
     <p:spTree>
@@ -7288,8 +7740,8 @@
             </p:nvSpPr>
             <p:spPr>
               <a:xfrm rot="21022874">
-                <a:off x="931563" y="3678724"/>
-                <a:ext cx="1249391" cy="480676"/>
+                <a:off x="1320372" y="3700532"/>
+                <a:ext cx="338696" cy="480676"/>
               </a:xfrm>
               <a:prstGeom prst="rect">
                 <a:avLst/>
@@ -7309,7 +7761,7 @@
                     </a:solidFill>
                     <a:latin typeface="Nyala" panose="02000504070300020003" pitchFamily="2" charset="0"/>
                   </a:rPr>
-                  <a:t>Sigma_circle</a:t>
+                  <a:t>zai</a:t>
                 </a:r>
                 <a:endParaRPr lang="en-CA" sz="4000" dirty="0">
                   <a:solidFill>
@@ -7824,48 +8276,7 @@
               </a:cxnLst>
               <a:rect l="l" t="t" r="r" b="b"/>
               <a:pathLst>
-                <a:path w="2785145" h="1342238" fill="none" extrusionOk="0">
-                  <a:moveTo>
-                    <a:pt x="0" y="352338"/>
-                  </a:moveTo>
-                  <a:cubicBezTo>
-                    <a:pt x="366931" y="581721"/>
-                    <a:pt x="596618" y="837784"/>
-                    <a:pt x="1006679" y="1342238"/>
-                  </a:cubicBezTo>
-                  <a:cubicBezTo>
-                    <a:pt x="1121611" y="1248201"/>
-                    <a:pt x="1604931" y="796784"/>
-                    <a:pt x="1661020" y="645952"/>
-                  </a:cubicBezTo>
-                  <a:cubicBezTo>
-                    <a:pt x="1745356" y="738195"/>
-                    <a:pt x="2017838" y="805916"/>
-                    <a:pt x="2348918" y="897622"/>
-                  </a:cubicBezTo>
-                  <a:cubicBezTo>
-                    <a:pt x="2378727" y="792779"/>
-                    <a:pt x="2527812" y="558450"/>
-                    <a:pt x="2785145" y="276837"/>
-                  </a:cubicBezTo>
-                  <a:cubicBezTo>
-                    <a:pt x="2607802" y="170816"/>
-                    <a:pt x="2308986" y="57314"/>
-                    <a:pt x="2063692" y="0"/>
-                  </a:cubicBezTo>
-                  <a:cubicBezTo>
-                    <a:pt x="1865877" y="157543"/>
-                    <a:pt x="1571810" y="476236"/>
-                    <a:pt x="1518407" y="553673"/>
-                  </a:cubicBezTo>
-                  <a:cubicBezTo>
-                    <a:pt x="1019075" y="427911"/>
-                    <a:pt x="741850" y="362351"/>
-                    <a:pt x="0" y="352338"/>
-                  </a:cubicBezTo>
-                  <a:close/>
-                </a:path>
-                <a:path w="2785145" h="1342238" stroke="0" extrusionOk="0">
+                <a:path w="2785145" h="1342238" extrusionOk="0">
                   <a:moveTo>
                     <a:pt x="0" y="352338"/>
                   </a:moveTo>
@@ -8453,6 +8864,81 @@
           </a:p>
         </p:txBody>
       </p:sp>
+      <p:sp>
+        <p:nvSpPr>
+          <p:cNvPr id="37" name="TextBox 36">
+            <a:extLst>
+              <a:ext uri="{FF2B5EF4-FFF2-40B4-BE49-F238E27FC236}">
+                <a16:creationId xmlns:a16="http://schemas.microsoft.com/office/drawing/2014/main" id="{289DD241-95AF-4C44-9FC0-E358A28B0AD7}"/>
+              </a:ext>
+            </a:extLst>
+          </p:cNvPr>
+          <p:cNvSpPr txBox="1"/>
+          <p:nvPr/>
+        </p:nvSpPr>
+        <p:spPr>
+          <a:xfrm rot="21022874">
+            <a:off x="8942401" y="5068474"/>
+            <a:ext cx="2873598" cy="707887"/>
+          </a:xfrm>
+          <a:prstGeom prst="rect">
+            <a:avLst/>
+          </a:prstGeom>
+          <a:noFill/>
+        </p:spPr>
+        <p:txBody>
+          <a:bodyPr wrap="square" rtlCol="0">
+            <a:spAutoFit/>
+          </a:bodyPr>
+          <a:lstStyle/>
+          <a:p>
+            <a:r>
+              <a:rPr lang="en-US" sz="4000" dirty="0" err="1">
+                <a:latin typeface="Nyala" panose="02000504070300020003" pitchFamily="2" charset="0"/>
+              </a:rPr>
+              <a:t>Sigma_circle</a:t>
+            </a:r>
+            <a:endParaRPr lang="en-CA" sz="4000" dirty="0">
+              <a:latin typeface="Nyala" panose="02000504070300020003" pitchFamily="2" charset="0"/>
+            </a:endParaRPr>
+          </a:p>
+        </p:txBody>
+      </p:sp>
+      <p:sp>
+        <p:nvSpPr>
+          <p:cNvPr id="38" name="TextBox 37">
+            <a:extLst>
+              <a:ext uri="{FF2B5EF4-FFF2-40B4-BE49-F238E27FC236}">
+                <a16:creationId xmlns:a16="http://schemas.microsoft.com/office/drawing/2014/main" id="{EEB94887-0421-4B98-B2A3-7B930C541F5E}"/>
+              </a:ext>
+            </a:extLst>
+          </p:cNvPr>
+          <p:cNvSpPr txBox="1"/>
+          <p:nvPr/>
+        </p:nvSpPr>
+        <p:spPr>
+          <a:xfrm>
+            <a:off x="9022402" y="365166"/>
+            <a:ext cx="1482054" cy="1569660"/>
+          </a:xfrm>
+          <a:prstGeom prst="rect">
+            <a:avLst/>
+          </a:prstGeom>
+          <a:noFill/>
+        </p:spPr>
+        <p:txBody>
+          <a:bodyPr wrap="square">
+            <a:spAutoFit/>
+          </a:bodyPr>
+          <a:lstStyle/>
+          <a:p>
+            <a:r>
+              <a:rPr lang="en-CA" sz="9600" dirty="0"/>
+              <a:t>在</a:t>
+            </a:r>
+          </a:p>
+        </p:txBody>
+      </p:sp>
     </p:spTree>
     <p:extLst>
       <p:ext uri="{BB962C8B-B14F-4D97-AF65-F5344CB8AC3E}">
@@ -8466,7 +8952,7 @@
 </p:sld>
 </file>
 
-<file path=ppt/slides/slide4.xml><?xml version="1.0" encoding="utf-8"?>
+<file path=ppt/slides/slide5.xml><?xml version="1.0" encoding="utf-8"?>
 <p:sld xmlns:a="http://schemas.openxmlformats.org/drawingml/2006/main" xmlns:r="http://schemas.openxmlformats.org/officeDocument/2006/relationships" xmlns:p="http://schemas.openxmlformats.org/presentationml/2006/main">
   <p:cSld>
     <p:spTree>
@@ -9255,8 +9741,8 @@
             </p:nvSpPr>
             <p:spPr>
               <a:xfrm rot="21022874">
-                <a:off x="898082" y="3732278"/>
-                <a:ext cx="1249391" cy="480676"/>
+                <a:off x="1240512" y="3766094"/>
+                <a:ext cx="497182" cy="392441"/>
               </a:xfrm>
               <a:prstGeom prst="rect">
                 <a:avLst/>
@@ -9270,13 +9756,13 @@
               <a:lstStyle/>
               <a:p>
                 <a:r>
-                  <a:rPr lang="en-US" sz="4000" dirty="0" err="1">
+                  <a:rPr lang="en-US" sz="4000" dirty="0">
                     <a:solidFill>
                       <a:schemeClr val="bg1"/>
                     </a:solidFill>
                     <a:latin typeface="Nyala" panose="02000504070300020003" pitchFamily="2" charset="0"/>
                   </a:rPr>
-                  <a:t>Gamma_block</a:t>
+                  <a:t>gong</a:t>
                 </a:r>
                 <a:endParaRPr lang="en-CA" sz="4000" dirty="0">
                   <a:solidFill>
@@ -19561,6 +20047,81 @@
           </a:p>
         </p:txBody>
       </p:sp>
+      <p:sp>
+        <p:nvSpPr>
+          <p:cNvPr id="95" name="TextBox 94">
+            <a:extLst>
+              <a:ext uri="{FF2B5EF4-FFF2-40B4-BE49-F238E27FC236}">
+                <a16:creationId xmlns:a16="http://schemas.microsoft.com/office/drawing/2014/main" id="{DBCB12D7-CB9D-4B8F-BF27-8F5332747797}"/>
+              </a:ext>
+            </a:extLst>
+          </p:cNvPr>
+          <p:cNvSpPr txBox="1"/>
+          <p:nvPr/>
+        </p:nvSpPr>
+        <p:spPr>
+          <a:xfrm rot="21022874">
+            <a:off x="8772732" y="5166923"/>
+            <a:ext cx="3152691" cy="707886"/>
+          </a:xfrm>
+          <a:prstGeom prst="rect">
+            <a:avLst/>
+          </a:prstGeom>
+          <a:noFill/>
+        </p:spPr>
+        <p:txBody>
+          <a:bodyPr wrap="square" rtlCol="0">
+            <a:spAutoFit/>
+          </a:bodyPr>
+          <a:lstStyle/>
+          <a:p>
+            <a:r>
+              <a:rPr lang="en-US" sz="4000" dirty="0" err="1">
+                <a:latin typeface="Nyala" panose="02000504070300020003" pitchFamily="2" charset="0"/>
+              </a:rPr>
+              <a:t>Gamma_block</a:t>
+            </a:r>
+            <a:endParaRPr lang="en-CA" sz="4000" dirty="0">
+              <a:latin typeface="Nyala" panose="02000504070300020003" pitchFamily="2" charset="0"/>
+            </a:endParaRPr>
+          </a:p>
+        </p:txBody>
+      </p:sp>
+      <p:sp>
+        <p:nvSpPr>
+          <p:cNvPr id="97" name="TextBox 96">
+            <a:extLst>
+              <a:ext uri="{FF2B5EF4-FFF2-40B4-BE49-F238E27FC236}">
+                <a16:creationId xmlns:a16="http://schemas.microsoft.com/office/drawing/2014/main" id="{B0279536-6997-4B94-A5CE-B8F72E35FE4E}"/>
+              </a:ext>
+            </a:extLst>
+          </p:cNvPr>
+          <p:cNvSpPr txBox="1"/>
+          <p:nvPr/>
+        </p:nvSpPr>
+        <p:spPr>
+          <a:xfrm>
+            <a:off x="9358589" y="149694"/>
+            <a:ext cx="1605822" cy="1569660"/>
+          </a:xfrm>
+          <a:prstGeom prst="rect">
+            <a:avLst/>
+          </a:prstGeom>
+          <a:noFill/>
+        </p:spPr>
+        <p:txBody>
+          <a:bodyPr wrap="square">
+            <a:spAutoFit/>
+          </a:bodyPr>
+          <a:lstStyle/>
+          <a:p>
+            <a:r>
+              <a:rPr lang="en-CA" sz="9600" dirty="0"/>
+              <a:t>宫</a:t>
+            </a:r>
+          </a:p>
+        </p:txBody>
+      </p:sp>
     </p:spTree>
     <p:extLst>
       <p:ext uri="{BB962C8B-B14F-4D97-AF65-F5344CB8AC3E}">

</xml_diff>